<commit_message>
network and crypto updates
</commit_message>
<xml_diff>
--- a/5.Crypto/Cryptology0-Modular-Arithmetic.pptx
+++ b/5.Crypto/Cryptology0-Modular-Arithmetic.pptx
@@ -207,7 +207,7 @@
           <a:p>
             <a:fld id="{7036936F-D5CE-4A4A-A458-1AE9014E9A6A}" type="datetimeFigureOut">
               <a:rPr lang="en-US" smtClean="0"/>
-              <a:t>8/25/2020</a:t>
+              <a:t>10/6/2020</a:t>
             </a:fld>
             <a:endParaRPr lang="en-US"/>
           </a:p>
@@ -513,6 +513,174 @@
             <p:ph type="body" idx="1"/>
           </p:nvPr>
         </p:nvSpPr>
+        <p:spPr/>
+        <p:txBody>
+          <a:bodyPr/>
+          <a:lstStyle/>
+          <a:p>
+            <a:endParaRPr lang="en-US"/>
+          </a:p>
+        </p:txBody>
+      </p:sp>
+      <p:sp>
+        <p:nvSpPr>
+          <p:cNvPr id="4" name="Slide Number Placeholder 3"/>
+          <p:cNvSpPr>
+            <a:spLocks noGrp="1"/>
+          </p:cNvSpPr>
+          <p:nvPr>
+            <p:ph type="sldNum" sz="quarter" idx="5"/>
+          </p:nvPr>
+        </p:nvSpPr>
+        <p:spPr/>
+        <p:txBody>
+          <a:bodyPr/>
+          <a:lstStyle/>
+          <a:p>
+            <a:fld id="{20D4CDCA-5F51-4F16-BDEE-761A7284BA0F}" type="slidenum">
+              <a:rPr lang="en-US" smtClean="0"/>
+              <a:t>6</a:t>
+            </a:fld>
+            <a:endParaRPr lang="en-US"/>
+          </a:p>
+        </p:txBody>
+      </p:sp>
+    </p:spTree>
+    <p:extLst>
+      <p:ext uri="{BB962C8B-B14F-4D97-AF65-F5344CB8AC3E}">
+        <p14:creationId xmlns:p14="http://schemas.microsoft.com/office/powerpoint/2010/main" val="859653805"/>
+      </p:ext>
+    </p:extLst>
+  </p:cSld>
+  <p:clrMapOvr>
+    <a:masterClrMapping/>
+  </p:clrMapOvr>
+</p:notes>
+</file>
+
+<file path=ppt/notesSlides/notesSlide2.xml><?xml version="1.0" encoding="utf-8"?>
+<p:notes xmlns:a="http://schemas.openxmlformats.org/drawingml/2006/main" xmlns:r="http://schemas.openxmlformats.org/officeDocument/2006/relationships" xmlns:p="http://schemas.openxmlformats.org/presentationml/2006/main">
+  <p:cSld>
+    <p:spTree>
+      <p:nvGrpSpPr>
+        <p:cNvPr id="1" name=""/>
+        <p:cNvGrpSpPr/>
+        <p:nvPr/>
+      </p:nvGrpSpPr>
+      <p:grpSpPr>
+        <a:xfrm>
+          <a:off x="0" y="0"/>
+          <a:ext cx="0" cy="0"/>
+          <a:chOff x="0" y="0"/>
+          <a:chExt cx="0" cy="0"/>
+        </a:xfrm>
+      </p:grpSpPr>
+      <p:sp>
+        <p:nvSpPr>
+          <p:cNvPr id="2" name="Slide Image Placeholder 1"/>
+          <p:cNvSpPr>
+            <a:spLocks noGrp="1" noRot="1" noChangeAspect="1"/>
+          </p:cNvSpPr>
+          <p:nvPr>
+            <p:ph type="sldImg"/>
+          </p:nvPr>
+        </p:nvSpPr>
+        <p:spPr/>
+      </p:sp>
+      <p:sp>
+        <p:nvSpPr>
+          <p:cNvPr id="3" name="Notes Placeholder 2"/>
+          <p:cNvSpPr>
+            <a:spLocks noGrp="1"/>
+          </p:cNvSpPr>
+          <p:nvPr>
+            <p:ph type="body" idx="1"/>
+          </p:nvPr>
+        </p:nvSpPr>
+        <p:spPr/>
+        <p:txBody>
+          <a:bodyPr/>
+          <a:lstStyle/>
+          <a:p>
+            <a:endParaRPr lang="en-US"/>
+          </a:p>
+        </p:txBody>
+      </p:sp>
+      <p:sp>
+        <p:nvSpPr>
+          <p:cNvPr id="4" name="Slide Number Placeholder 3"/>
+          <p:cNvSpPr>
+            <a:spLocks noGrp="1"/>
+          </p:cNvSpPr>
+          <p:nvPr>
+            <p:ph type="sldNum" sz="quarter" idx="5"/>
+          </p:nvPr>
+        </p:nvSpPr>
+        <p:spPr/>
+        <p:txBody>
+          <a:bodyPr/>
+          <a:lstStyle/>
+          <a:p>
+            <a:fld id="{20D4CDCA-5F51-4F16-BDEE-761A7284BA0F}" type="slidenum">
+              <a:rPr lang="en-US" smtClean="0"/>
+              <a:t>7</a:t>
+            </a:fld>
+            <a:endParaRPr lang="en-US"/>
+          </a:p>
+        </p:txBody>
+      </p:sp>
+    </p:spTree>
+    <p:extLst>
+      <p:ext uri="{BB962C8B-B14F-4D97-AF65-F5344CB8AC3E}">
+        <p14:creationId xmlns:p14="http://schemas.microsoft.com/office/powerpoint/2010/main" val="1585368486"/>
+      </p:ext>
+    </p:extLst>
+  </p:cSld>
+  <p:clrMapOvr>
+    <a:masterClrMapping/>
+  </p:clrMapOvr>
+</p:notes>
+</file>
+
+<file path=ppt/notesSlides/notesSlide3.xml><?xml version="1.0" encoding="utf-8"?>
+<p:notes xmlns:a="http://schemas.openxmlformats.org/drawingml/2006/main" xmlns:r="http://schemas.openxmlformats.org/officeDocument/2006/relationships" xmlns:p="http://schemas.openxmlformats.org/presentationml/2006/main">
+  <p:cSld>
+    <p:spTree>
+      <p:nvGrpSpPr>
+        <p:cNvPr id="1" name=""/>
+        <p:cNvGrpSpPr/>
+        <p:nvPr/>
+      </p:nvGrpSpPr>
+      <p:grpSpPr>
+        <a:xfrm>
+          <a:off x="0" y="0"/>
+          <a:ext cx="0" cy="0"/>
+          <a:chOff x="0" y="0"/>
+          <a:chExt cx="0" cy="0"/>
+        </a:xfrm>
+      </p:grpSpPr>
+      <p:sp>
+        <p:nvSpPr>
+          <p:cNvPr id="2" name="Slide Image Placeholder 1"/>
+          <p:cNvSpPr>
+            <a:spLocks noGrp="1" noRot="1" noChangeAspect="1"/>
+          </p:cNvSpPr>
+          <p:nvPr>
+            <p:ph type="sldImg"/>
+          </p:nvPr>
+        </p:nvSpPr>
+        <p:spPr/>
+      </p:sp>
+      <p:sp>
+        <p:nvSpPr>
+          <p:cNvPr id="3" name="Notes Placeholder 2"/>
+          <p:cNvSpPr>
+            <a:spLocks noGrp="1"/>
+          </p:cNvSpPr>
+          <p:nvPr>
+            <p:ph type="body" idx="1"/>
+          </p:nvPr>
+        </p:nvSpPr>
         <p:spPr>
           <a:xfrm>
             <a:off x="685800" y="4400549"/>
@@ -819,7 +987,7 @@
           <a:p>
             <a:fld id="{272BFD90-4C17-4F8F-9B2A-7FB96AF51220}" type="datetimeFigureOut">
               <a:rPr lang="en-US" smtClean="0"/>
-              <a:t>8/25/2020</a:t>
+              <a:t>10/6/2020</a:t>
             </a:fld>
             <a:endParaRPr lang="en-US"/>
           </a:p>
@@ -1017,7 +1185,7 @@
           <a:p>
             <a:fld id="{272BFD90-4C17-4F8F-9B2A-7FB96AF51220}" type="datetimeFigureOut">
               <a:rPr lang="en-US" smtClean="0"/>
-              <a:t>8/25/2020</a:t>
+              <a:t>10/6/2020</a:t>
             </a:fld>
             <a:endParaRPr lang="en-US"/>
           </a:p>
@@ -1225,7 +1393,7 @@
           <a:p>
             <a:fld id="{272BFD90-4C17-4F8F-9B2A-7FB96AF51220}" type="datetimeFigureOut">
               <a:rPr lang="en-US" smtClean="0"/>
-              <a:t>8/25/2020</a:t>
+              <a:t>10/6/2020</a:t>
             </a:fld>
             <a:endParaRPr lang="en-US"/>
           </a:p>
@@ -1423,7 +1591,7 @@
           <a:p>
             <a:fld id="{272BFD90-4C17-4F8F-9B2A-7FB96AF51220}" type="datetimeFigureOut">
               <a:rPr lang="en-US" smtClean="0"/>
-              <a:t>8/25/2020</a:t>
+              <a:t>10/6/2020</a:t>
             </a:fld>
             <a:endParaRPr lang="en-US"/>
           </a:p>
@@ -1698,7 +1866,7 @@
           <a:p>
             <a:fld id="{272BFD90-4C17-4F8F-9B2A-7FB96AF51220}" type="datetimeFigureOut">
               <a:rPr lang="en-US" smtClean="0"/>
-              <a:t>8/25/2020</a:t>
+              <a:t>10/6/2020</a:t>
             </a:fld>
             <a:endParaRPr lang="en-US"/>
           </a:p>
@@ -1963,7 +2131,7 @@
           <a:p>
             <a:fld id="{272BFD90-4C17-4F8F-9B2A-7FB96AF51220}" type="datetimeFigureOut">
               <a:rPr lang="en-US" smtClean="0"/>
-              <a:t>8/25/2020</a:t>
+              <a:t>10/6/2020</a:t>
             </a:fld>
             <a:endParaRPr lang="en-US"/>
           </a:p>
@@ -2375,7 +2543,7 @@
           <a:p>
             <a:fld id="{272BFD90-4C17-4F8F-9B2A-7FB96AF51220}" type="datetimeFigureOut">
               <a:rPr lang="en-US" smtClean="0"/>
-              <a:t>8/25/2020</a:t>
+              <a:t>10/6/2020</a:t>
             </a:fld>
             <a:endParaRPr lang="en-US"/>
           </a:p>
@@ -2516,7 +2684,7 @@
           <a:p>
             <a:fld id="{272BFD90-4C17-4F8F-9B2A-7FB96AF51220}" type="datetimeFigureOut">
               <a:rPr lang="en-US" smtClean="0"/>
-              <a:t>8/25/2020</a:t>
+              <a:t>10/6/2020</a:t>
             </a:fld>
             <a:endParaRPr lang="en-US"/>
           </a:p>
@@ -2629,7 +2797,7 @@
           <a:p>
             <a:fld id="{272BFD90-4C17-4F8F-9B2A-7FB96AF51220}" type="datetimeFigureOut">
               <a:rPr lang="en-US" smtClean="0"/>
-              <a:t>8/25/2020</a:t>
+              <a:t>10/6/2020</a:t>
             </a:fld>
             <a:endParaRPr lang="en-US"/>
           </a:p>
@@ -2940,7 +3108,7 @@
           <a:p>
             <a:fld id="{272BFD90-4C17-4F8F-9B2A-7FB96AF51220}" type="datetimeFigureOut">
               <a:rPr lang="en-US" smtClean="0"/>
-              <a:t>8/25/2020</a:t>
+              <a:t>10/6/2020</a:t>
             </a:fld>
             <a:endParaRPr lang="en-US"/>
           </a:p>
@@ -3228,7 +3396,7 @@
           <a:p>
             <a:fld id="{272BFD90-4C17-4F8F-9B2A-7FB96AF51220}" type="datetimeFigureOut">
               <a:rPr lang="en-US" smtClean="0"/>
-              <a:t>8/25/2020</a:t>
+              <a:t>10/6/2020</a:t>
             </a:fld>
             <a:endParaRPr lang="en-US"/>
           </a:p>
@@ -3469,7 +3637,7 @@
           <a:p>
             <a:fld id="{272BFD90-4C17-4F8F-9B2A-7FB96AF51220}" type="datetimeFigureOut">
               <a:rPr lang="en-US" smtClean="0"/>
-              <a:t>8/25/2020</a:t>
+              <a:t>10/6/2020</a:t>
             </a:fld>
             <a:endParaRPr lang="en-US"/>
           </a:p>
@@ -5106,7 +5274,7 @@
             </a:r>
             <a:r>
               <a:rPr lang="en-US" dirty="0"/>
-              <a:t>(13, 26) = 2</a:t>
+              <a:t>(13, 26) = 13</a:t>
             </a:r>
           </a:p>
           <a:p>
@@ -5304,7 +5472,7 @@
           <p:nvPr/>
         </p:nvPicPr>
         <p:blipFill>
-          <a:blip r:embed="rId2"/>
+          <a:blip r:embed="rId3"/>
           <a:stretch>
             <a:fillRect/>
           </a:stretch>

</xml_diff>